<commit_message>
Removed spurious voice annotation
</commit_message>
<xml_diff>
--- a/pzo/docs/PuzzleOracleManual-data-formats.pptx
+++ b/pzo/docs/PuzzleOracleManual-data-formats.pptx
@@ -222,7 +222,7 @@
           <a:p>
             <a:fld id="{D5B0DF5E-C77E-47C9-AC2A-718CB970998B}" type="datetimeFigureOut">
               <a:rPr lang="en-US" smtClean="0"/>
-              <a:t>10/10/2015</a:t>
+              <a:t>11/2/2016</a:t>
             </a:fld>
             <a:endParaRPr lang="en-US"/>
           </a:p>
@@ -286,38 +286,37 @@
           <a:p>
             <a:pPr lvl="0"/>
             <a:r>
-              <a:rPr lang="en-US" smtClean="0"/>
+              <a:rPr lang="en-US"/>
               <a:t>Click to edit Master text styles</a:t>
             </a:r>
           </a:p>
           <a:p>
             <a:pPr lvl="1"/>
             <a:r>
-              <a:rPr lang="en-US" smtClean="0"/>
+              <a:rPr lang="en-US"/>
               <a:t>Second level</a:t>
             </a:r>
           </a:p>
           <a:p>
             <a:pPr lvl="2"/>
             <a:r>
-              <a:rPr lang="en-US" smtClean="0"/>
+              <a:rPr lang="en-US"/>
               <a:t>Third level</a:t>
             </a:r>
           </a:p>
           <a:p>
             <a:pPr lvl="3"/>
             <a:r>
-              <a:rPr lang="en-US" smtClean="0"/>
+              <a:rPr lang="en-US"/>
               <a:t>Fourth level</a:t>
             </a:r>
           </a:p>
           <a:p>
             <a:pPr lvl="4"/>
             <a:r>
-              <a:rPr lang="en-US" smtClean="0"/>
+              <a:rPr lang="en-US"/>
               <a:t>Fifth level</a:t>
             </a:r>
-            <a:endParaRPr lang="en-US"/>
           </a:p>
         </p:txBody>
       </p:sp>
@@ -535,19 +534,19 @@
           <a:lstStyle/>
           <a:p>
             <a:r>
-              <a:rPr lang="en-US" dirty="0" smtClean="0"/>
+              <a:rPr lang="en-US" dirty="0"/>
               <a:t>Welcome to a brief</a:t>
             </a:r>
             <a:r>
-              <a:rPr lang="en-US" baseline="0" dirty="0" smtClean="0"/>
+              <a:rPr lang="en-US" baseline="0" dirty="0"/>
               <a:t> introduction to Puzzle Oracle. This presentation is to be viewed as a Microsoft "Mix" because the annotations add an important component. The Puzzle Oracle is an windows executable program. It is designed to be self-contained – everything it needs is on a thumb drive, including the program itself. It does not require administrator </a:t>
             </a:r>
             <a:r>
-              <a:rPr lang="en-US" baseline="0" dirty="0" err="1" smtClean="0"/>
+              <a:rPr lang="en-US" baseline="0" dirty="0" err="1"/>
               <a:t>preveleges</a:t>
             </a:r>
             <a:r>
-              <a:rPr lang="en-US" baseline="0" dirty="0" smtClean="0"/>
+              <a:rPr lang="en-US" baseline="0" dirty="0"/>
               <a:t> to run and does not access the network or any other location on the PC. Let's take a look at the thumb drive contents….</a:t>
             </a:r>
             <a:endParaRPr lang="en-US" dirty="0"/>
@@ -632,10 +631,9 @@
           </a:lstStyle>
           <a:p>
             <a:r>
-              <a:rPr lang="en-US" smtClean="0"/>
+              <a:rPr lang="en-US"/>
               <a:t>Click to edit Master title style</a:t>
             </a:r>
-            <a:endParaRPr lang="en-US"/>
           </a:p>
         </p:txBody>
       </p:sp>
@@ -697,10 +695,9 @@
           </a:lstStyle>
           <a:p>
             <a:r>
-              <a:rPr lang="en-US" smtClean="0"/>
+              <a:rPr lang="en-US"/>
               <a:t>Click to edit Master subtitle style</a:t>
             </a:r>
-            <a:endParaRPr lang="en-US"/>
           </a:p>
         </p:txBody>
       </p:sp>
@@ -721,7 +718,7 @@
           <a:p>
             <a:fld id="{EB640143-E19F-45F2-BCBF-04629A74F388}" type="datetimeFigureOut">
               <a:rPr lang="en-US" smtClean="0"/>
-              <a:t>10/10/2015</a:t>
+              <a:t>11/2/2016</a:t>
             </a:fld>
             <a:endParaRPr lang="en-US"/>
           </a:p>
@@ -815,10 +812,9 @@
           <a:lstStyle/>
           <a:p>
             <a:r>
-              <a:rPr lang="en-US" smtClean="0"/>
+              <a:rPr lang="en-US"/>
               <a:t>Click to edit Master title style</a:t>
             </a:r>
-            <a:endParaRPr lang="en-US"/>
           </a:p>
         </p:txBody>
       </p:sp>
@@ -839,38 +835,37 @@
           <a:p>
             <a:pPr lvl="0"/>
             <a:r>
-              <a:rPr lang="en-US" smtClean="0"/>
+              <a:rPr lang="en-US"/>
               <a:t>Click to edit Master text styles</a:t>
             </a:r>
           </a:p>
           <a:p>
             <a:pPr lvl="1"/>
             <a:r>
-              <a:rPr lang="en-US" smtClean="0"/>
+              <a:rPr lang="en-US"/>
               <a:t>Second level</a:t>
             </a:r>
           </a:p>
           <a:p>
             <a:pPr lvl="2"/>
             <a:r>
-              <a:rPr lang="en-US" smtClean="0"/>
+              <a:rPr lang="en-US"/>
               <a:t>Third level</a:t>
             </a:r>
           </a:p>
           <a:p>
             <a:pPr lvl="3"/>
             <a:r>
-              <a:rPr lang="en-US" smtClean="0"/>
+              <a:rPr lang="en-US"/>
               <a:t>Fourth level</a:t>
             </a:r>
           </a:p>
           <a:p>
             <a:pPr lvl="4"/>
             <a:r>
-              <a:rPr lang="en-US" smtClean="0"/>
+              <a:rPr lang="en-US"/>
               <a:t>Fifth level</a:t>
             </a:r>
-            <a:endParaRPr lang="en-US"/>
           </a:p>
         </p:txBody>
       </p:sp>
@@ -891,7 +886,7 @@
           <a:p>
             <a:fld id="{EB640143-E19F-45F2-BCBF-04629A74F388}" type="datetimeFigureOut">
               <a:rPr lang="en-US" smtClean="0"/>
-              <a:t>10/10/2015</a:t>
+              <a:t>11/2/2016</a:t>
             </a:fld>
             <a:endParaRPr lang="en-US"/>
           </a:p>
@@ -990,10 +985,9 @@
           <a:lstStyle/>
           <a:p>
             <a:r>
-              <a:rPr lang="en-US" smtClean="0"/>
+              <a:rPr lang="en-US"/>
               <a:t>Click to edit Master title style</a:t>
             </a:r>
-            <a:endParaRPr lang="en-US"/>
           </a:p>
         </p:txBody>
       </p:sp>
@@ -1019,38 +1013,37 @@
           <a:p>
             <a:pPr lvl="0"/>
             <a:r>
-              <a:rPr lang="en-US" smtClean="0"/>
+              <a:rPr lang="en-US"/>
               <a:t>Click to edit Master text styles</a:t>
             </a:r>
           </a:p>
           <a:p>
             <a:pPr lvl="1"/>
             <a:r>
-              <a:rPr lang="en-US" smtClean="0"/>
+              <a:rPr lang="en-US"/>
               <a:t>Second level</a:t>
             </a:r>
           </a:p>
           <a:p>
             <a:pPr lvl="2"/>
             <a:r>
-              <a:rPr lang="en-US" smtClean="0"/>
+              <a:rPr lang="en-US"/>
               <a:t>Third level</a:t>
             </a:r>
           </a:p>
           <a:p>
             <a:pPr lvl="3"/>
             <a:r>
-              <a:rPr lang="en-US" smtClean="0"/>
+              <a:rPr lang="en-US"/>
               <a:t>Fourth level</a:t>
             </a:r>
           </a:p>
           <a:p>
             <a:pPr lvl="4"/>
             <a:r>
-              <a:rPr lang="en-US" smtClean="0"/>
+              <a:rPr lang="en-US"/>
               <a:t>Fifth level</a:t>
             </a:r>
-            <a:endParaRPr lang="en-US"/>
           </a:p>
         </p:txBody>
       </p:sp>
@@ -1071,7 +1064,7 @@
           <a:p>
             <a:fld id="{EB640143-E19F-45F2-BCBF-04629A74F388}" type="datetimeFigureOut">
               <a:rPr lang="en-US" smtClean="0"/>
-              <a:t>10/10/2015</a:t>
+              <a:t>11/2/2016</a:t>
             </a:fld>
             <a:endParaRPr lang="en-US"/>
           </a:p>
@@ -1165,10 +1158,9 @@
           <a:lstStyle/>
           <a:p>
             <a:r>
-              <a:rPr lang="en-US" smtClean="0"/>
+              <a:rPr lang="en-US"/>
               <a:t>Click to edit Master title style</a:t>
             </a:r>
-            <a:endParaRPr lang="en-US"/>
           </a:p>
         </p:txBody>
       </p:sp>
@@ -1189,38 +1181,37 @@
           <a:p>
             <a:pPr lvl="0"/>
             <a:r>
-              <a:rPr lang="en-US" smtClean="0"/>
+              <a:rPr lang="en-US"/>
               <a:t>Click to edit Master text styles</a:t>
             </a:r>
           </a:p>
           <a:p>
             <a:pPr lvl="1"/>
             <a:r>
-              <a:rPr lang="en-US" smtClean="0"/>
+              <a:rPr lang="en-US"/>
               <a:t>Second level</a:t>
             </a:r>
           </a:p>
           <a:p>
             <a:pPr lvl="2"/>
             <a:r>
-              <a:rPr lang="en-US" smtClean="0"/>
+              <a:rPr lang="en-US"/>
               <a:t>Third level</a:t>
             </a:r>
           </a:p>
           <a:p>
             <a:pPr lvl="3"/>
             <a:r>
-              <a:rPr lang="en-US" smtClean="0"/>
+              <a:rPr lang="en-US"/>
               <a:t>Fourth level</a:t>
             </a:r>
           </a:p>
           <a:p>
             <a:pPr lvl="4"/>
             <a:r>
-              <a:rPr lang="en-US" smtClean="0"/>
+              <a:rPr lang="en-US"/>
               <a:t>Fifth level</a:t>
             </a:r>
-            <a:endParaRPr lang="en-US"/>
           </a:p>
         </p:txBody>
       </p:sp>
@@ -1241,7 +1232,7 @@
           <a:p>
             <a:fld id="{EB640143-E19F-45F2-BCBF-04629A74F388}" type="datetimeFigureOut">
               <a:rPr lang="en-US" smtClean="0"/>
-              <a:t>10/10/2015</a:t>
+              <a:t>11/2/2016</a:t>
             </a:fld>
             <a:endParaRPr lang="en-US"/>
           </a:p>
@@ -1344,10 +1335,9 @@
           </a:lstStyle>
           <a:p>
             <a:r>
-              <a:rPr lang="en-US" smtClean="0"/>
+              <a:rPr lang="en-US"/>
               <a:t>Click to edit Master title style</a:t>
             </a:r>
-            <a:endParaRPr lang="en-US"/>
           </a:p>
         </p:txBody>
       </p:sp>
@@ -1464,7 +1454,7 @@
           <a:p>
             <a:pPr lvl="0"/>
             <a:r>
-              <a:rPr lang="en-US" smtClean="0"/>
+              <a:rPr lang="en-US"/>
               <a:t>Click to edit Master text styles</a:t>
             </a:r>
           </a:p>
@@ -1487,7 +1477,7 @@
           <a:p>
             <a:fld id="{EB640143-E19F-45F2-BCBF-04629A74F388}" type="datetimeFigureOut">
               <a:rPr lang="en-US" smtClean="0"/>
-              <a:t>10/10/2015</a:t>
+              <a:t>11/2/2016</a:t>
             </a:fld>
             <a:endParaRPr lang="en-US"/>
           </a:p>
@@ -1581,10 +1571,9 @@
           <a:lstStyle/>
           <a:p>
             <a:r>
-              <a:rPr lang="en-US" smtClean="0"/>
+              <a:rPr lang="en-US"/>
               <a:t>Click to edit Master title style</a:t>
             </a:r>
-            <a:endParaRPr lang="en-US"/>
           </a:p>
         </p:txBody>
       </p:sp>
@@ -1610,38 +1599,37 @@
           <a:p>
             <a:pPr lvl="0"/>
             <a:r>
-              <a:rPr lang="en-US" smtClean="0"/>
+              <a:rPr lang="en-US"/>
               <a:t>Click to edit Master text styles</a:t>
             </a:r>
           </a:p>
           <a:p>
             <a:pPr lvl="1"/>
             <a:r>
-              <a:rPr lang="en-US" smtClean="0"/>
+              <a:rPr lang="en-US"/>
               <a:t>Second level</a:t>
             </a:r>
           </a:p>
           <a:p>
             <a:pPr lvl="2"/>
             <a:r>
-              <a:rPr lang="en-US" smtClean="0"/>
+              <a:rPr lang="en-US"/>
               <a:t>Third level</a:t>
             </a:r>
           </a:p>
           <a:p>
             <a:pPr lvl="3"/>
             <a:r>
-              <a:rPr lang="en-US" smtClean="0"/>
+              <a:rPr lang="en-US"/>
               <a:t>Fourth level</a:t>
             </a:r>
           </a:p>
           <a:p>
             <a:pPr lvl="4"/>
             <a:r>
-              <a:rPr lang="en-US" smtClean="0"/>
+              <a:rPr lang="en-US"/>
               <a:t>Fifth level</a:t>
             </a:r>
-            <a:endParaRPr lang="en-US"/>
           </a:p>
         </p:txBody>
       </p:sp>
@@ -1667,38 +1655,37 @@
           <a:p>
             <a:pPr lvl="0"/>
             <a:r>
-              <a:rPr lang="en-US" smtClean="0"/>
+              <a:rPr lang="en-US"/>
               <a:t>Click to edit Master text styles</a:t>
             </a:r>
           </a:p>
           <a:p>
             <a:pPr lvl="1"/>
             <a:r>
-              <a:rPr lang="en-US" smtClean="0"/>
+              <a:rPr lang="en-US"/>
               <a:t>Second level</a:t>
             </a:r>
           </a:p>
           <a:p>
             <a:pPr lvl="2"/>
             <a:r>
-              <a:rPr lang="en-US" smtClean="0"/>
+              <a:rPr lang="en-US"/>
               <a:t>Third level</a:t>
             </a:r>
           </a:p>
           <a:p>
             <a:pPr lvl="3"/>
             <a:r>
-              <a:rPr lang="en-US" smtClean="0"/>
+              <a:rPr lang="en-US"/>
               <a:t>Fourth level</a:t>
             </a:r>
           </a:p>
           <a:p>
             <a:pPr lvl="4"/>
             <a:r>
-              <a:rPr lang="en-US" smtClean="0"/>
+              <a:rPr lang="en-US"/>
               <a:t>Fifth level</a:t>
             </a:r>
-            <a:endParaRPr lang="en-US"/>
           </a:p>
         </p:txBody>
       </p:sp>
@@ -1719,7 +1706,7 @@
           <a:p>
             <a:fld id="{EB640143-E19F-45F2-BCBF-04629A74F388}" type="datetimeFigureOut">
               <a:rPr lang="en-US" smtClean="0"/>
-              <a:t>10/10/2015</a:t>
+              <a:t>11/2/2016</a:t>
             </a:fld>
             <a:endParaRPr lang="en-US"/>
           </a:p>
@@ -1818,10 +1805,9 @@
           <a:lstStyle/>
           <a:p>
             <a:r>
-              <a:rPr lang="en-US" smtClean="0"/>
+              <a:rPr lang="en-US"/>
               <a:t>Click to edit Master title style</a:t>
             </a:r>
-            <a:endParaRPr lang="en-US"/>
           </a:p>
         </p:txBody>
       </p:sp>
@@ -1884,7 +1870,7 @@
           <a:p>
             <a:pPr lvl="0"/>
             <a:r>
-              <a:rPr lang="en-US" smtClean="0"/>
+              <a:rPr lang="en-US"/>
               <a:t>Click to edit Master text styles</a:t>
             </a:r>
           </a:p>
@@ -1912,38 +1898,37 @@
           <a:p>
             <a:pPr lvl="0"/>
             <a:r>
-              <a:rPr lang="en-US" smtClean="0"/>
+              <a:rPr lang="en-US"/>
               <a:t>Click to edit Master text styles</a:t>
             </a:r>
           </a:p>
           <a:p>
             <a:pPr lvl="1"/>
             <a:r>
-              <a:rPr lang="en-US" smtClean="0"/>
+              <a:rPr lang="en-US"/>
               <a:t>Second level</a:t>
             </a:r>
           </a:p>
           <a:p>
             <a:pPr lvl="2"/>
             <a:r>
-              <a:rPr lang="en-US" smtClean="0"/>
+              <a:rPr lang="en-US"/>
               <a:t>Third level</a:t>
             </a:r>
           </a:p>
           <a:p>
             <a:pPr lvl="3"/>
             <a:r>
-              <a:rPr lang="en-US" smtClean="0"/>
+              <a:rPr lang="en-US"/>
               <a:t>Fourth level</a:t>
             </a:r>
           </a:p>
           <a:p>
             <a:pPr lvl="4"/>
             <a:r>
-              <a:rPr lang="en-US" smtClean="0"/>
+              <a:rPr lang="en-US"/>
               <a:t>Fifth level</a:t>
             </a:r>
-            <a:endParaRPr lang="en-US"/>
           </a:p>
         </p:txBody>
       </p:sp>
@@ -2006,7 +1991,7 @@
           <a:p>
             <a:pPr lvl="0"/>
             <a:r>
-              <a:rPr lang="en-US" smtClean="0"/>
+              <a:rPr lang="en-US"/>
               <a:t>Click to edit Master text styles</a:t>
             </a:r>
           </a:p>
@@ -2034,38 +2019,37 @@
           <a:p>
             <a:pPr lvl="0"/>
             <a:r>
-              <a:rPr lang="en-US" smtClean="0"/>
+              <a:rPr lang="en-US"/>
               <a:t>Click to edit Master text styles</a:t>
             </a:r>
           </a:p>
           <a:p>
             <a:pPr lvl="1"/>
             <a:r>
-              <a:rPr lang="en-US" smtClean="0"/>
+              <a:rPr lang="en-US"/>
               <a:t>Second level</a:t>
             </a:r>
           </a:p>
           <a:p>
             <a:pPr lvl="2"/>
             <a:r>
-              <a:rPr lang="en-US" smtClean="0"/>
+              <a:rPr lang="en-US"/>
               <a:t>Third level</a:t>
             </a:r>
           </a:p>
           <a:p>
             <a:pPr lvl="3"/>
             <a:r>
-              <a:rPr lang="en-US" smtClean="0"/>
+              <a:rPr lang="en-US"/>
               <a:t>Fourth level</a:t>
             </a:r>
           </a:p>
           <a:p>
             <a:pPr lvl="4"/>
             <a:r>
-              <a:rPr lang="en-US" smtClean="0"/>
+              <a:rPr lang="en-US"/>
               <a:t>Fifth level</a:t>
             </a:r>
-            <a:endParaRPr lang="en-US"/>
           </a:p>
         </p:txBody>
       </p:sp>
@@ -2086,7 +2070,7 @@
           <a:p>
             <a:fld id="{EB640143-E19F-45F2-BCBF-04629A74F388}" type="datetimeFigureOut">
               <a:rPr lang="en-US" smtClean="0"/>
-              <a:t>10/10/2015</a:t>
+              <a:t>11/2/2016</a:t>
             </a:fld>
             <a:endParaRPr lang="en-US"/>
           </a:p>
@@ -2180,10 +2164,9 @@
           <a:lstStyle/>
           <a:p>
             <a:r>
-              <a:rPr lang="en-US" smtClean="0"/>
+              <a:rPr lang="en-US"/>
               <a:t>Click to edit Master title style</a:t>
             </a:r>
-            <a:endParaRPr lang="en-US"/>
           </a:p>
         </p:txBody>
       </p:sp>
@@ -2204,7 +2187,7 @@
           <a:p>
             <a:fld id="{EB640143-E19F-45F2-BCBF-04629A74F388}" type="datetimeFigureOut">
               <a:rPr lang="en-US" smtClean="0"/>
-              <a:t>10/10/2015</a:t>
+              <a:t>11/2/2016</a:t>
             </a:fld>
             <a:endParaRPr lang="en-US"/>
           </a:p>
@@ -2299,7 +2282,7 @@
           <a:p>
             <a:fld id="{EB640143-E19F-45F2-BCBF-04629A74F388}" type="datetimeFigureOut">
               <a:rPr lang="en-US" smtClean="0"/>
-              <a:t>10/10/2015</a:t>
+              <a:t>11/2/2016</a:t>
             </a:fld>
             <a:endParaRPr lang="en-US"/>
           </a:p>
@@ -2402,10 +2385,9 @@
           </a:lstStyle>
           <a:p>
             <a:r>
-              <a:rPr lang="en-US" smtClean="0"/>
+              <a:rPr lang="en-US"/>
               <a:t>Click to edit Master title style</a:t>
             </a:r>
-            <a:endParaRPr lang="en-US"/>
           </a:p>
         </p:txBody>
       </p:sp>
@@ -2459,38 +2441,37 @@
           <a:p>
             <a:pPr lvl="0"/>
             <a:r>
-              <a:rPr lang="en-US" smtClean="0"/>
+              <a:rPr lang="en-US"/>
               <a:t>Click to edit Master text styles</a:t>
             </a:r>
           </a:p>
           <a:p>
             <a:pPr lvl="1"/>
             <a:r>
-              <a:rPr lang="en-US" smtClean="0"/>
+              <a:rPr lang="en-US"/>
               <a:t>Second level</a:t>
             </a:r>
           </a:p>
           <a:p>
             <a:pPr lvl="2"/>
             <a:r>
-              <a:rPr lang="en-US" smtClean="0"/>
+              <a:rPr lang="en-US"/>
               <a:t>Third level</a:t>
             </a:r>
           </a:p>
           <a:p>
             <a:pPr lvl="3"/>
             <a:r>
-              <a:rPr lang="en-US" smtClean="0"/>
+              <a:rPr lang="en-US"/>
               <a:t>Fourth level</a:t>
             </a:r>
           </a:p>
           <a:p>
             <a:pPr lvl="4"/>
             <a:r>
-              <a:rPr lang="en-US" smtClean="0"/>
+              <a:rPr lang="en-US"/>
               <a:t>Fifth level</a:t>
             </a:r>
-            <a:endParaRPr lang="en-US"/>
           </a:p>
         </p:txBody>
       </p:sp>
@@ -2553,7 +2534,7 @@
           <a:p>
             <a:pPr lvl="0"/>
             <a:r>
-              <a:rPr lang="en-US" smtClean="0"/>
+              <a:rPr lang="en-US"/>
               <a:t>Click to edit Master text styles</a:t>
             </a:r>
           </a:p>
@@ -2576,7 +2557,7 @@
           <a:p>
             <a:fld id="{EB640143-E19F-45F2-BCBF-04629A74F388}" type="datetimeFigureOut">
               <a:rPr lang="en-US" smtClean="0"/>
-              <a:t>10/10/2015</a:t>
+              <a:t>11/2/2016</a:t>
             </a:fld>
             <a:endParaRPr lang="en-US"/>
           </a:p>
@@ -2679,10 +2660,9 @@
           </a:lstStyle>
           <a:p>
             <a:r>
-              <a:rPr lang="en-US" smtClean="0"/>
+              <a:rPr lang="en-US"/>
               <a:t>Click to edit Master title style</a:t>
             </a:r>
-            <a:endParaRPr lang="en-US"/>
           </a:p>
         </p:txBody>
       </p:sp>
@@ -2806,7 +2786,7 @@
           <a:p>
             <a:pPr lvl="0"/>
             <a:r>
-              <a:rPr lang="en-US" smtClean="0"/>
+              <a:rPr lang="en-US"/>
               <a:t>Click to edit Master text styles</a:t>
             </a:r>
           </a:p>
@@ -2829,7 +2809,7 @@
           <a:p>
             <a:fld id="{EB640143-E19F-45F2-BCBF-04629A74F388}" type="datetimeFigureOut">
               <a:rPr lang="en-US" smtClean="0"/>
-              <a:t>10/10/2015</a:t>
+              <a:t>11/2/2016</a:t>
             </a:fld>
             <a:endParaRPr lang="en-US"/>
           </a:p>
@@ -2938,10 +2918,9 @@
           <a:lstStyle/>
           <a:p>
             <a:r>
-              <a:rPr lang="en-US" smtClean="0"/>
+              <a:rPr lang="en-US"/>
               <a:t>Click to edit Master title style</a:t>
             </a:r>
-            <a:endParaRPr lang="en-US"/>
           </a:p>
         </p:txBody>
       </p:sp>
@@ -2972,38 +2951,37 @@
           <a:p>
             <a:pPr lvl="0"/>
             <a:r>
-              <a:rPr lang="en-US" smtClean="0"/>
+              <a:rPr lang="en-US"/>
               <a:t>Click to edit Master text styles</a:t>
             </a:r>
           </a:p>
           <a:p>
             <a:pPr lvl="1"/>
             <a:r>
-              <a:rPr lang="en-US" smtClean="0"/>
+              <a:rPr lang="en-US"/>
               <a:t>Second level</a:t>
             </a:r>
           </a:p>
           <a:p>
             <a:pPr lvl="2"/>
             <a:r>
-              <a:rPr lang="en-US" smtClean="0"/>
+              <a:rPr lang="en-US"/>
               <a:t>Third level</a:t>
             </a:r>
           </a:p>
           <a:p>
             <a:pPr lvl="3"/>
             <a:r>
-              <a:rPr lang="en-US" smtClean="0"/>
+              <a:rPr lang="en-US"/>
               <a:t>Fourth level</a:t>
             </a:r>
           </a:p>
           <a:p>
             <a:pPr lvl="4"/>
             <a:r>
-              <a:rPr lang="en-US" smtClean="0"/>
+              <a:rPr lang="en-US"/>
               <a:t>Fifth level</a:t>
             </a:r>
-            <a:endParaRPr lang="en-US"/>
           </a:p>
         </p:txBody>
       </p:sp>
@@ -3042,7 +3020,7 @@
           <a:p>
             <a:fld id="{EB640143-E19F-45F2-BCBF-04629A74F388}" type="datetimeFigureOut">
               <a:rPr lang="en-US" smtClean="0"/>
-              <a:t>10/10/2015</a:t>
+              <a:t>11/2/2016</a:t>
             </a:fld>
             <a:endParaRPr lang="en-US"/>
           </a:p>
@@ -3463,25 +3441,20 @@
           <a:lstStyle/>
           <a:p>
             <a:r>
-              <a:rPr lang="en-US" dirty="0" smtClean="0"/>
+              <a:rPr lang="en-US" dirty="0"/>
               <a:t>Puzzle Oracle Manual</a:t>
             </a:r>
             <a:br>
-              <a:rPr lang="en-US" dirty="0" smtClean="0"/>
+              <a:rPr lang="en-US" dirty="0"/>
             </a:br>
             <a:r>
-              <a:rPr lang="en-US" sz="4800" dirty="0" smtClean="0">
+              <a:rPr lang="en-US" sz="4800" dirty="0">
                 <a:solidFill>
                   <a:schemeClr val="accent1"/>
                 </a:solidFill>
               </a:rPr>
               <a:t>Data Formats</a:t>
             </a:r>
-            <a:endParaRPr lang="en-US" sz="4800" dirty="0">
-              <a:solidFill>
-                <a:schemeClr val="accent1"/>
-              </a:solidFill>
-            </a:endParaRPr>
           </a:p>
         </p:txBody>
       </p:sp>
@@ -3508,72 +3481,60 @@
           <a:lstStyle/>
           <a:p>
             <a:r>
-              <a:rPr lang="en-US" dirty="0" smtClean="0"/>
+              <a:rPr lang="en-US" dirty="0"/>
               <a:t>For puzzle creators, event administrators and event instructors</a:t>
             </a:r>
             <a:br>
-              <a:rPr lang="en-US" dirty="0" smtClean="0"/>
+              <a:rPr lang="en-US" dirty="0"/>
             </a:br>
-            <a:r>
-              <a:rPr lang="en-US" dirty="0" smtClean="0"/>
-              <a:t/>
-            </a:r>
             <a:br>
-              <a:rPr lang="en-US" dirty="0" smtClean="0"/>
+              <a:rPr lang="en-US" dirty="0"/>
             </a:br>
             <a:r>
-              <a:rPr lang="en-US" dirty="0" smtClean="0"/>
+              <a:rPr lang="en-US" dirty="0"/>
               <a:t>Covers Software Version: 0.0</a:t>
             </a:r>
           </a:p>
           <a:p>
-            <a:endParaRPr lang="en-US" dirty="0" smtClean="0"/>
-          </a:p>
-          <a:p>
-            <a:r>
-              <a:rPr lang="en-US" dirty="0" smtClean="0"/>
+            <a:endParaRPr lang="en-US" dirty="0"/>
+          </a:p>
+          <a:p>
+            <a:r>
+              <a:rPr lang="en-US" dirty="0"/>
               <a:t>By Joseph M. Joy</a:t>
             </a:r>
           </a:p>
           <a:p>
-            <a:endParaRPr lang="en-US" dirty="0" smtClean="0"/>
-          </a:p>
-          <a:p>
-            <a:r>
-              <a:rPr lang="en-US" dirty="0" smtClean="0"/>
+            <a:endParaRPr lang="en-US" dirty="0"/>
+          </a:p>
+          <a:p>
+            <a:r>
+              <a:rPr lang="en-US" dirty="0"/>
               <a:t>Copyright © 2015, Rinworks, LLC</a:t>
             </a:r>
             <a:br>
-              <a:rPr lang="en-US" dirty="0" smtClean="0"/>
+              <a:rPr lang="en-US" dirty="0"/>
             </a:br>
             <a:r>
-              <a:rPr lang="en-US" dirty="0" smtClean="0"/>
+              <a:rPr lang="en-US" dirty="0"/>
               <a:t>Creative Commons License "</a:t>
             </a:r>
             <a:r>
-              <a:rPr lang="en-US" dirty="0" smtClean="0">
+              <a:rPr lang="en-US" dirty="0">
                 <a:effectLst/>
               </a:rPr>
               <a:t>Attribution 4.0 International (CC BY 4.0)"</a:t>
             </a:r>
             <a:br>
-              <a:rPr lang="en-US" dirty="0" smtClean="0">
+              <a:rPr lang="en-US" dirty="0">
                 <a:effectLst/>
               </a:rPr>
             </a:br>
             <a:r>
-              <a:rPr lang="en-US" dirty="0" smtClean="0"/>
-              <a:t>(http</a:t>
-            </a:r>
-            <a:r>
               <a:rPr lang="en-US" dirty="0"/>
-              <a:t>://creativecommons.org/licenses/by/4.0</a:t>
-            </a:r>
-            <a:r>
-              <a:rPr lang="en-US" dirty="0" smtClean="0"/>
-              <a:t>/)</a:t>
-            </a:r>
-            <a:endParaRPr lang="en-US" dirty="0" smtClean="0">
+              <a:t>(http://creativecommons.org/licenses/by/4.0/)</a:t>
+            </a:r>
+            <a:endParaRPr lang="en-US" dirty="0">
               <a:effectLst/>
             </a:endParaRPr>
           </a:p>
@@ -3582,45 +3543,6 @@
           </a:p>
         </p:txBody>
       </p:sp>
-      <p:pic>
-        <p:nvPicPr>
-          <p:cNvPr id="9" name="tmpD0C8">
-            <a:hlinkClick r:id="" action="ppaction://media"/>
-          </p:cNvPr>
-          <p:cNvPicPr>
-            <a:picLocks noChangeAspect="1"/>
-          </p:cNvPicPr>
-          <p:nvPr>
-            <a:videoFile r:link="rId3"/>
-            <p:custDataLst>
-              <p:custData r:id="rId4"/>
-              <p:tags r:id="rId5"/>
-            </p:custDataLst>
-            <p:extLst>
-              <p:ext uri="{DAA4B4D4-6D71-4841-9C94-3DE7FCFB9230}">
-                <p14:media xmlns:p14="http://schemas.microsoft.com/office/powerpoint/2010/main" r:embed="rId6">
-                  <p14:trim end="71298.2"/>
-                </p14:media>
-              </p:ext>
-            </p:extLst>
-          </p:nvPr>
-        </p:nvPicPr>
-        <p:blipFill>
-          <a:blip r:embed="rId9"/>
-          <a:stretch>
-            <a:fillRect/>
-          </a:stretch>
-        </p:blipFill>
-        <p:spPr>
-          <a:xfrm>
-            <a:off x="11861800" y="101600"/>
-            <a:ext cx="228600" cy="228600"/>
-          </a:xfrm>
-          <a:prstGeom prst="rect">
-            <a:avLst/>
-          </a:prstGeom>
-        </p:spPr>
-      </p:pic>
     </p:spTree>
     <p:custDataLst>
       <p:custData r:id="rId1"/>
@@ -3635,94 +3557,6 @@
   <p:clrMapOvr>
     <a:masterClrMapping/>
   </p:clrMapOvr>
-  <mc:AlternateContent xmlns:mc="http://schemas.openxmlformats.org/markup-compatibility/2006" xmlns:p14="http://schemas.microsoft.com/office/powerpoint/2010/main">
-    <mc:Choice Requires="p14">
-      <p:transition spd="slow" p14:dur="2000"/>
-    </mc:Choice>
-    <mc:Fallback xmlns="">
-      <p:transition spd="slow"/>
-    </mc:Fallback>
-  </mc:AlternateContent>
-  <p:timing>
-    <p:tnLst>
-      <p:par>
-        <p:cTn id="1" dur="indefinite" restart="never" nodeType="tmRoot">
-          <p:childTnLst>
-            <p:seq concurrent="1" nextAc="seek">
-              <p:cTn id="2" restart="whenNotActive" fill="hold" evtFilter="cancelBubble" nodeType="interactiveSeq">
-                <p:stCondLst>
-                  <p:cond evt="onClick" delay="0">
-                    <p:tgtEl>
-                      <p:spTgt spid="9"/>
-                    </p:tgtEl>
-                  </p:cond>
-                </p:stCondLst>
-                <p:endSync evt="end" delay="0">
-                  <p:rtn val="all"/>
-                </p:endSync>
-                <p:childTnLst>
-                  <p:par>
-                    <p:cTn id="3" fill="hold">
-                      <p:stCondLst>
-                        <p:cond delay="0"/>
-                      </p:stCondLst>
-                      <p:childTnLst>
-                        <p:par>
-                          <p:cTn id="4" fill="hold">
-                            <p:stCondLst>
-                              <p:cond delay="0"/>
-                            </p:stCondLst>
-                            <p:childTnLst>
-                              <p:par>
-                                <p:cTn id="5" presetID="2" presetClass="mediacall" presetSubtype="0" fill="hold" nodeType="clickEffect">
-                                  <p:stCondLst>
-                                    <p:cond delay="0"/>
-                                  </p:stCondLst>
-                                  <p:childTnLst>
-                                    <p:cmd type="call" cmd="togglePause">
-                                      <p:cBhvr>
-                                        <p:cTn id="6" dur="1" fill="hold"/>
-                                        <p:tgtEl>
-                                          <p:spTgt spid="9"/>
-                                        </p:tgtEl>
-                                      </p:cBhvr>
-                                    </p:cmd>
-                                  </p:childTnLst>
-                                </p:cTn>
-                              </p:par>
-                            </p:childTnLst>
-                          </p:cTn>
-                        </p:par>
-                      </p:childTnLst>
-                    </p:cTn>
-                  </p:par>
-                </p:childTnLst>
-              </p:cTn>
-              <p:nextCondLst>
-                <p:cond evt="onClick" delay="0">
-                  <p:tgtEl>
-                    <p:spTgt spid="9"/>
-                  </p:tgtEl>
-                </p:cond>
-              </p:nextCondLst>
-            </p:seq>
-            <p:video>
-              <p:cMediaNode vol="80000">
-                <p:cTn id="7" fill="hold" display="0">
-                  <p:stCondLst>
-                    <p:cond delay="indefinite"/>
-                  </p:stCondLst>
-                </p:cTn>
-                <p:tgtEl>
-                  <p:spTgt spid="9"/>
-                </p:tgtEl>
-              </p:cMediaNode>
-            </p:video>
-          </p:childTnLst>
-        </p:cTn>
-      </p:par>
-    </p:tnLst>
-  </p:timing>
 </p:sld>
 </file>
 
@@ -3759,46 +3593,45 @@
           <a:lstStyle/>
           <a:p>
             <a:r>
-              <a:rPr lang="en-US" dirty="0" smtClean="0"/>
+              <a:rPr lang="en-US" dirty="0"/>
               <a:t>Contents</a:t>
             </a:r>
+          </a:p>
+        </p:txBody>
+      </p:sp>
+      <p:sp>
+        <p:nvSpPr>
+          <p:cNvPr id="3" name="Content Placeholder 2"/>
+          <p:cNvSpPr>
+            <a:spLocks noGrp="1"/>
+          </p:cNvSpPr>
+          <p:nvPr>
+            <p:ph idx="1"/>
+          </p:nvPr>
+        </p:nvSpPr>
+        <p:spPr/>
+        <p:txBody>
+          <a:bodyPr/>
+          <a:lstStyle/>
+          <a:p>
+            <a:r>
+              <a:rPr lang="en-US" dirty="0"/>
+              <a:t>Master spreadsheet</a:t>
+            </a:r>
+          </a:p>
+          <a:p>
             <a:endParaRPr lang="en-US" dirty="0"/>
           </a:p>
-        </p:txBody>
-      </p:sp>
-      <p:sp>
-        <p:nvSpPr>
-          <p:cNvPr id="3" name="Content Placeholder 2"/>
-          <p:cNvSpPr>
-            <a:spLocks noGrp="1"/>
-          </p:cNvSpPr>
-          <p:nvPr>
-            <p:ph idx="1"/>
-          </p:nvPr>
-        </p:nvSpPr>
-        <p:spPr/>
-        <p:txBody>
-          <a:bodyPr/>
-          <a:lstStyle/>
-          <a:p>
-            <a:r>
-              <a:rPr lang="en-US" dirty="0" smtClean="0"/>
-              <a:t>Master spreadsheet</a:t>
-            </a:r>
-          </a:p>
-          <a:p>
-            <a:endParaRPr lang="en-US" dirty="0" smtClean="0"/>
-          </a:p>
-          <a:p>
-            <a:r>
-              <a:rPr lang="en-US" dirty="0" smtClean="0"/>
+          <a:p>
+            <a:r>
+              <a:rPr lang="en-US" dirty="0"/>
               <a:t>Input files</a:t>
             </a:r>
           </a:p>
           <a:p>
             <a:pPr lvl="1"/>
             <a:r>
-              <a:rPr lang="en-US" dirty="0" smtClean="0">
+              <a:rPr lang="en-US" dirty="0">
                 <a:solidFill>
                   <a:srgbClr val="00B0F0"/>
                 </a:solidFill>
@@ -3808,14 +3641,14 @@
               <a:t>puzzle-data.csv</a:t>
             </a:r>
             <a:r>
-              <a:rPr lang="en-US" dirty="0" smtClean="0"/>
+              <a:rPr lang="en-US" dirty="0"/>
               <a:t>	- puzzle ids, names, answers, hints</a:t>
             </a:r>
           </a:p>
           <a:p>
             <a:pPr lvl="1"/>
             <a:r>
-              <a:rPr lang="en-US" dirty="0" smtClean="0">
+              <a:rPr lang="en-US" dirty="0">
                 <a:solidFill>
                   <a:srgbClr val="00B0F0"/>
                 </a:solidFill>
@@ -3825,14 +3658,14 @@
               <a:t>team-data.csv</a:t>
             </a:r>
             <a:r>
-              <a:rPr lang="en-US" dirty="0" smtClean="0"/>
+              <a:rPr lang="en-US" dirty="0"/>
               <a:t>	- team ids, names, machine names</a:t>
             </a:r>
           </a:p>
           <a:p>
             <a:pPr lvl="1"/>
             <a:r>
-              <a:rPr lang="en-US" dirty="0" smtClean="0">
+              <a:rPr lang="en-US" dirty="0">
                 <a:solidFill>
                   <a:srgbClr val="00B0F0"/>
                 </a:solidFill>
@@ -3848,14 +3681,14 @@
           </a:p>
           <a:p>
             <a:r>
-              <a:rPr lang="en-US" dirty="0" smtClean="0"/>
+              <a:rPr lang="en-US" dirty="0"/>
               <a:t>Output files</a:t>
             </a:r>
           </a:p>
           <a:p>
             <a:pPr lvl="1"/>
             <a:r>
-              <a:rPr lang="en-US" i="1" dirty="0" smtClean="0">
+              <a:rPr lang="en-US" i="1" dirty="0">
                 <a:solidFill>
                   <a:srgbClr val="00B0F0"/>
                 </a:solidFill>
@@ -3865,7 +3698,7 @@
               <a:t>logs\</a:t>
             </a:r>
             <a:r>
-              <a:rPr lang="en-US" i="1" dirty="0" smtClean="0">
+              <a:rPr lang="en-US" i="1" dirty="0">
                 <a:solidFill>
                   <a:srgbClr val="00B0F0"/>
                 </a:solidFill>
@@ -3873,7 +3706,7 @@
               <a:t>&lt;team Id&gt;</a:t>
             </a:r>
             <a:r>
-              <a:rPr lang="en-US" dirty="0" smtClean="0">
+              <a:rPr lang="en-US" dirty="0">
                 <a:solidFill>
                   <a:srgbClr val="00B0F0"/>
                 </a:solidFill>
@@ -3881,7 +3714,7 @@
               <a:t>-&lt;</a:t>
             </a:r>
             <a:r>
-              <a:rPr lang="en-US" i="1" dirty="0" smtClean="0">
+              <a:rPr lang="en-US" i="1" dirty="0">
                 <a:solidFill>
                   <a:srgbClr val="00B0F0"/>
                 </a:solidFill>
@@ -3889,7 +3722,7 @@
               <a:t>machine name&gt;</a:t>
             </a:r>
             <a:r>
-              <a:rPr lang="en-US" dirty="0" smtClean="0">
+              <a:rPr lang="en-US" dirty="0">
                 <a:solidFill>
                   <a:srgbClr val="00B0F0"/>
                 </a:solidFill>
@@ -3897,7 +3730,7 @@
               <a:t>-&lt;</a:t>
             </a:r>
             <a:r>
-              <a:rPr lang="en-US" i="1" dirty="0" smtClean="0">
+              <a:rPr lang="en-US" i="1" dirty="0">
                 <a:solidFill>
                   <a:srgbClr val="00B0F0"/>
                 </a:solidFill>
@@ -3905,7 +3738,7 @@
               <a:t>random string&gt;</a:t>
             </a:r>
             <a:r>
-              <a:rPr lang="en-US" dirty="0" smtClean="0">
+              <a:rPr lang="en-US" dirty="0">
                 <a:solidFill>
                   <a:srgbClr val="00B0F0"/>
                 </a:solidFill>
@@ -3915,7 +3748,7 @@
               <a:t>.csv</a:t>
             </a:r>
             <a:r>
-              <a:rPr lang="en-US" dirty="0" smtClean="0">
+              <a:rPr lang="en-US" dirty="0">
                 <a:latin typeface="Consolas" panose="020B0609020204030204" pitchFamily="49" charset="0"/>
                 <a:cs typeface="Consolas" panose="020B0609020204030204" pitchFamily="49" charset="0"/>
               </a:rPr>
@@ -3925,19 +3758,15 @@
               <a:rPr lang="en-US" dirty="0"/>
               <a:t>– submission logs</a:t>
             </a:r>
-            <a:r>
-              <a:rPr lang="en-US" dirty="0" smtClean="0"/>
-              <a:t/>
-            </a:r>
             <a:br>
-              <a:rPr lang="en-US" dirty="0" smtClean="0"/>
+              <a:rPr lang="en-US" dirty="0"/>
             </a:br>
             <a:r>
-              <a:rPr lang="en-US" dirty="0" smtClean="0"/>
+              <a:rPr lang="en-US" dirty="0"/>
               <a:t>Example: </a:t>
             </a:r>
             <a:r>
-              <a:rPr lang="en-US" i="1" dirty="0" smtClean="0">
+              <a:rPr lang="en-US" i="1" dirty="0">
                 <a:solidFill>
                   <a:srgbClr val="00B0F0"/>
                 </a:solidFill>
@@ -3947,7 +3776,7 @@
               <a:t>logs\</a:t>
             </a:r>
             <a:r>
-              <a:rPr lang="en-US" dirty="0" smtClean="0">
+              <a:rPr lang="en-US" dirty="0">
                 <a:solidFill>
                   <a:srgbClr val="00B0F0"/>
                 </a:solidFill>
@@ -4005,18 +3834,17 @@
           <a:lstStyle/>
           <a:p>
             <a:r>
-              <a:rPr lang="en-US" dirty="0" smtClean="0"/>
+              <a:rPr lang="en-US" dirty="0"/>
               <a:t>Master Spreadsheet – </a:t>
             </a:r>
             <a:r>
-              <a:rPr lang="en-US" b="1" dirty="0" smtClean="0"/>
+              <a:rPr lang="en-US" b="1" dirty="0"/>
               <a:t>puzzle-data</a:t>
             </a:r>
             <a:r>
-              <a:rPr lang="en-US" dirty="0" smtClean="0"/>
+              <a:rPr lang="en-US" dirty="0"/>
               <a:t> sheet</a:t>
             </a:r>
-            <a:endParaRPr lang="en-US" dirty="0"/>
           </a:p>
         </p:txBody>
       </p:sp>
@@ -4090,18 +3918,17 @@
           <a:lstStyle/>
           <a:p>
             <a:r>
-              <a:rPr lang="en-US" dirty="0" smtClean="0"/>
+              <a:rPr lang="en-US" dirty="0"/>
               <a:t>Master Spreadsheet – </a:t>
             </a:r>
             <a:r>
-              <a:rPr lang="en-US" b="1" dirty="0" smtClean="0"/>
+              <a:rPr lang="en-US" b="1" dirty="0"/>
               <a:t>team-data</a:t>
             </a:r>
             <a:r>
-              <a:rPr lang="en-US" dirty="0" smtClean="0"/>
+              <a:rPr lang="en-US" dirty="0"/>
               <a:t> sheet</a:t>
             </a:r>
-            <a:endParaRPr lang="en-US" dirty="0"/>
           </a:p>
         </p:txBody>
       </p:sp>
@@ -4175,17 +4002,16 @@
           <a:lstStyle/>
           <a:p>
             <a:r>
-              <a:rPr lang="en-US" dirty="0" smtClean="0">
+              <a:rPr lang="en-US" dirty="0">
                 <a:latin typeface="Consolas" panose="020B0609020204030204" pitchFamily="49" charset="0"/>
                 <a:cs typeface="Consolas" panose="020B0609020204030204" pitchFamily="49" charset="0"/>
               </a:rPr>
               <a:t>puzzle-data.csv</a:t>
             </a:r>
             <a:r>
-              <a:rPr lang="en-US" dirty="0" smtClean="0"/>
+              <a:rPr lang="en-US" dirty="0"/>
               <a:t> (encrypted puzzle data)</a:t>
             </a:r>
-            <a:endParaRPr lang="en-US" dirty="0"/>
           </a:p>
         </p:txBody>
       </p:sp>
@@ -4260,83 +4086,69 @@
           <a:p>
             <a:r>
               <a:rPr lang="en-US" dirty="0"/>
-              <a:t>T</a:t>
-            </a:r>
-            <a:r>
-              <a:rPr lang="en-US" dirty="0" smtClean="0"/>
-              <a:t>eam </a:t>
-            </a:r>
-            <a:r>
-              <a:rPr lang="en-US" dirty="0"/>
-              <a:t>D</a:t>
-            </a:r>
-            <a:r>
-              <a:rPr lang="en-US" dirty="0" smtClean="0"/>
-              <a:t>ata</a:t>
-            </a:r>
+              <a:t>Team Data</a:t>
+            </a:r>
+          </a:p>
+        </p:txBody>
+      </p:sp>
+      <p:sp>
+        <p:nvSpPr>
+          <p:cNvPr id="3" name="Content Placeholder 2"/>
+          <p:cNvSpPr>
+            <a:spLocks noGrp="1"/>
+          </p:cNvSpPr>
+          <p:nvPr>
+            <p:ph idx="1"/>
+          </p:nvPr>
+        </p:nvSpPr>
+        <p:spPr/>
+        <p:txBody>
+          <a:bodyPr/>
+          <a:lstStyle/>
+          <a:p>
+            <a:pPr marL="0" indent="0">
+              <a:buNone/>
+            </a:pPr>
+            <a:r>
+              <a:rPr lang="en-US" sz="3200" dirty="0"/>
+              <a:t>team-data.csv</a:t>
+            </a:r>
+          </a:p>
+          <a:p>
             <a:endParaRPr lang="en-US" dirty="0"/>
           </a:p>
-        </p:txBody>
-      </p:sp>
-      <p:sp>
-        <p:nvSpPr>
-          <p:cNvPr id="3" name="Content Placeholder 2"/>
-          <p:cNvSpPr>
-            <a:spLocks noGrp="1"/>
-          </p:cNvSpPr>
-          <p:nvPr>
-            <p:ph idx="1"/>
-          </p:nvPr>
-        </p:nvSpPr>
-        <p:spPr/>
-        <p:txBody>
-          <a:bodyPr/>
-          <a:lstStyle/>
+          <a:p>
+            <a:endParaRPr lang="en-US" dirty="0"/>
+          </a:p>
+          <a:p>
+            <a:endParaRPr lang="en-US" dirty="0"/>
+          </a:p>
           <a:p>
             <a:pPr marL="0" indent="0">
               <a:buNone/>
             </a:pPr>
-            <a:r>
-              <a:rPr lang="en-US" sz="3200" dirty="0" smtClean="0"/>
-              <a:t>team-data.csv</a:t>
-            </a:r>
             <a:endParaRPr lang="en-US" sz="3200" dirty="0"/>
           </a:p>
           <a:p>
-            <a:endParaRPr lang="en-US" dirty="0" smtClean="0"/>
+            <a:pPr marL="0" indent="0">
+              <a:buNone/>
+            </a:pPr>
+            <a:r>
+              <a:rPr lang="en-US" sz="3200" dirty="0"/>
+              <a:t>current-team.txt</a:t>
+            </a:r>
           </a:p>
           <a:p>
             <a:endParaRPr lang="en-US" dirty="0"/>
           </a:p>
           <a:p>
-            <a:endParaRPr lang="en-US" dirty="0" smtClean="0"/>
-          </a:p>
-          <a:p>
-            <a:pPr marL="0" indent="0">
-              <a:buNone/>
-            </a:pPr>
-            <a:endParaRPr lang="en-US" sz="3200" dirty="0" smtClean="0"/>
-          </a:p>
-          <a:p>
-            <a:pPr marL="0" indent="0">
-              <a:buNone/>
-            </a:pPr>
-            <a:r>
-              <a:rPr lang="en-US" sz="3200" dirty="0" smtClean="0"/>
-              <a:t>current-team.txt</a:t>
-            </a:r>
-          </a:p>
-          <a:p>
             <a:endParaRPr lang="en-US" dirty="0"/>
           </a:p>
           <a:p>
-            <a:endParaRPr lang="en-US" dirty="0" smtClean="0"/>
-          </a:p>
-          <a:p>
             <a:endParaRPr lang="en-US" dirty="0"/>
           </a:p>
           <a:p>
-            <a:endParaRPr lang="en-US" dirty="0" smtClean="0"/>
+            <a:endParaRPr lang="en-US" dirty="0"/>
           </a:p>
           <a:p>
             <a:endParaRPr lang="en-US" dirty="0"/>
@@ -4443,10 +4255,9 @@
           <a:lstStyle/>
           <a:p>
             <a:r>
-              <a:rPr lang="en-US" dirty="0" smtClean="0"/>
+              <a:rPr lang="en-US" dirty="0"/>
               <a:t>Submission log (example)</a:t>
             </a:r>
-            <a:endParaRPr lang="en-US" dirty="0"/>
           </a:p>
         </p:txBody>
       </p:sp>
@@ -4474,16 +4285,12 @@
               <a:buNone/>
             </a:pPr>
             <a:r>
-              <a:rPr lang="en-US" dirty="0" smtClean="0">
+              <a:rPr lang="en-US" dirty="0">
                 <a:latin typeface="Consolas" panose="020B0609020204030204" pitchFamily="49" charset="0"/>
                 <a:cs typeface="Consolas" panose="020B0609020204030204" pitchFamily="49" charset="0"/>
               </a:rPr>
               <a:t>T3-JOSEPHJ-MYHP-n2lkm_wc.csv</a:t>
             </a:r>
-            <a:endParaRPr lang="en-US" dirty="0">
-              <a:latin typeface="Consolas" panose="020B0609020204030204" pitchFamily="49" charset="0"/>
-              <a:cs typeface="Consolas" panose="020B0609020204030204" pitchFamily="49" charset="0"/>
-            </a:endParaRPr>
           </a:p>
         </p:txBody>
       </p:sp>
@@ -4526,15 +4333,8 @@
 
 <file path=ppt/tags/tag1.xml><?xml version="1.0" encoding="utf-8"?>
 <p:tagLst xmlns:a="http://schemas.openxmlformats.org/drawingml/2006/main" xmlns:r="http://schemas.openxmlformats.org/officeDocument/2006/relationships" xmlns:p="http://schemas.openxmlformats.org/presentationml/2006/main">
-  <p:tag name="ATHENA.CUSTOMXMLID" val="{E872C328-892B-41A3-8BE6-9986341E3567}"/>
+  <p:tag name="ATHENA.CUSTOMXMLID" val="{B17A48FB-DDB1-4628-9629-5E18D0A35F2E}"/>
   <p:tag name="ATHENA.CUSTOMXMLCONTENT" val="&lt;?xml version=&quot;1.0&quot;?&gt;&lt;athena xmlns=&quot;http://schemas.microsoft.com/edu/athena&quot; version=&quot;0.1.3396.0&quot;&gt;&lt;timings duration=&quot;24035&quot;/&gt;&lt;/athena&gt;"/>
-</p:tagLst>
-</file>
-
-<file path=ppt/tags/tag2.xml><?xml version="1.0" encoding="utf-8"?>
-<p:tagLst xmlns:a="http://schemas.openxmlformats.org/drawingml/2006/main" xmlns:r="http://schemas.openxmlformats.org/officeDocument/2006/relationships" xmlns:p="http://schemas.openxmlformats.org/presentationml/2006/main">
-  <p:tag name="ATHENA.CUSTOMXMLID" val="{0CC14DFF-D09B-4A4D-8038-771549339128}"/>
-  <p:tag name="ATHENA.CUSTOMXMLCONTENT" val="&lt;?xml version=&quot;1.0&quot;?&gt;&lt;athena xmlns=&quot;http://schemas.microsoft.com/edu/athena&quot; version=&quot;0.1.3396.0&quot;&gt;&lt;media streamable=&quot;true&quot; recordStart=&quot;0&quot; recordEnd=&quot;24035&quot; recordLength=&quot;95333&quot; audioOnly=&quot;true&quot; start=&quot;0&quot; end=&quot;24035&quot; audioFormat=&quot;{00001610-0000-0010-8000-00AA00389B71}&quot; audioRate=&quot;44100&quot; muted=&quot;false&quot; volume=&quot;0.8&quot; fadeIn=&quot;0&quot; fadeOut=&quot;0&quot; videoFormat=&quot;{34363248-0000-0010-8000-00AA00389B71}&quot; videoRate=&quot;15&quot; videoWidth=&quot;256&quot; videoHeight=&quot;256&quot;/&gt;&lt;/athena&gt;"/>
 </p:tagLst>
 </file>
 
@@ -5062,18 +4862,18 @@
 
 <file path=customXml/item1.xml><?xml version="1.0" encoding="utf-8"?>
 <athena xmlns="http://schemas.microsoft.com/edu/athena" version="0.1.3396.0">
-  <media streamable="true" recordStart="0" recordEnd="24035" recordLength="95333" audioOnly="true" start="0" end="24035" audioFormat="{00001610-0000-0010-8000-00AA00389B71}" audioRate="44100" muted="false" volume="0.8" fadeIn="0" fadeOut="0" videoFormat="{34363248-0000-0010-8000-00AA00389B71}" videoRate="15" videoWidth="256" videoHeight="256"/>
+  <timings duration="24035"/>
 </athena>
 </file>
 
 <file path=customXml/item2.xml><?xml version="1.0" encoding="utf-8"?>
 <athena xmlns="http://schemas.microsoft.com/edu/athena" version="0.1.3396.0">
-  <timings duration="24035"/>
+  <media streamable="true" recordStart="0" recordEnd="24035" recordLength="95333" audioOnly="true" start="0" end="24035" audioFormat="{00001610-0000-0010-8000-00AA00389B71}" audioRate="44100" muted="false" volume="0.8" fadeIn="0" fadeOut="0" videoFormat="{34363248-0000-0010-8000-00AA00389B71}" videoRate="15" videoWidth="256" videoHeight="256"/>
 </athena>
 </file>
 
 <file path=customXml/itemProps1.xml><?xml version="1.0" encoding="utf-8"?>
-<ds:datastoreItem xmlns:ds="http://schemas.openxmlformats.org/officeDocument/2006/customXml" ds:itemID="{A18FCAFB-0F45-4B4C-AF00-DC78305A925B}">
+<ds:datastoreItem xmlns:ds="http://schemas.openxmlformats.org/officeDocument/2006/customXml" ds:itemID="{B17A48FB-DDB1-4628-9629-5E18D0A35F2E}">
   <ds:schemaRefs>
     <ds:schemaRef ds:uri="http://schemas.microsoft.com/edu/athena"/>
   </ds:schemaRefs>
@@ -5081,7 +4881,7 @@
 </file>
 
 <file path=customXml/itemProps2.xml><?xml version="1.0" encoding="utf-8"?>
-<ds:datastoreItem xmlns:ds="http://schemas.openxmlformats.org/officeDocument/2006/customXml" ds:itemID="{8DFC7CFD-2DFB-4433-A4C5-9A3F789E700F}">
+<ds:datastoreItem xmlns:ds="http://schemas.openxmlformats.org/officeDocument/2006/customXml" ds:itemID="{13F46FCB-918E-4816-8A8C-A50CF511954F}">
   <ds:schemaRefs>
     <ds:schemaRef ds:uri="http://schemas.microsoft.com/edu/athena"/>
   </ds:schemaRefs>

</xml_diff>

<commit_message>
Updated data format presentation - just with copyright year.
</commit_message>
<xml_diff>
--- a/pzo/docs/PuzzleOracleManual-data-formats.pptx
+++ b/pzo/docs/PuzzleOracleManual-data-formats.pptx
@@ -222,7 +222,7 @@
           <a:p>
             <a:fld id="{D5B0DF5E-C77E-47C9-AC2A-718CB970998B}" type="datetimeFigureOut">
               <a:rPr lang="en-US" smtClean="0"/>
-              <a:t>11/2/2016</a:t>
+              <a:t>11/5/2016</a:t>
             </a:fld>
             <a:endParaRPr lang="en-US"/>
           </a:p>
@@ -718,7 +718,7 @@
           <a:p>
             <a:fld id="{EB640143-E19F-45F2-BCBF-04629A74F388}" type="datetimeFigureOut">
               <a:rPr lang="en-US" smtClean="0"/>
-              <a:t>11/2/2016</a:t>
+              <a:t>11/5/2016</a:t>
             </a:fld>
             <a:endParaRPr lang="en-US"/>
           </a:p>
@@ -886,7 +886,7 @@
           <a:p>
             <a:fld id="{EB640143-E19F-45F2-BCBF-04629A74F388}" type="datetimeFigureOut">
               <a:rPr lang="en-US" smtClean="0"/>
-              <a:t>11/2/2016</a:t>
+              <a:t>11/5/2016</a:t>
             </a:fld>
             <a:endParaRPr lang="en-US"/>
           </a:p>
@@ -1064,7 +1064,7 @@
           <a:p>
             <a:fld id="{EB640143-E19F-45F2-BCBF-04629A74F388}" type="datetimeFigureOut">
               <a:rPr lang="en-US" smtClean="0"/>
-              <a:t>11/2/2016</a:t>
+              <a:t>11/5/2016</a:t>
             </a:fld>
             <a:endParaRPr lang="en-US"/>
           </a:p>
@@ -1232,7 +1232,7 @@
           <a:p>
             <a:fld id="{EB640143-E19F-45F2-BCBF-04629A74F388}" type="datetimeFigureOut">
               <a:rPr lang="en-US" smtClean="0"/>
-              <a:t>11/2/2016</a:t>
+              <a:t>11/5/2016</a:t>
             </a:fld>
             <a:endParaRPr lang="en-US"/>
           </a:p>
@@ -1477,7 +1477,7 @@
           <a:p>
             <a:fld id="{EB640143-E19F-45F2-BCBF-04629A74F388}" type="datetimeFigureOut">
               <a:rPr lang="en-US" smtClean="0"/>
-              <a:t>11/2/2016</a:t>
+              <a:t>11/5/2016</a:t>
             </a:fld>
             <a:endParaRPr lang="en-US"/>
           </a:p>
@@ -1706,7 +1706,7 @@
           <a:p>
             <a:fld id="{EB640143-E19F-45F2-BCBF-04629A74F388}" type="datetimeFigureOut">
               <a:rPr lang="en-US" smtClean="0"/>
-              <a:t>11/2/2016</a:t>
+              <a:t>11/5/2016</a:t>
             </a:fld>
             <a:endParaRPr lang="en-US"/>
           </a:p>
@@ -2070,7 +2070,7 @@
           <a:p>
             <a:fld id="{EB640143-E19F-45F2-BCBF-04629A74F388}" type="datetimeFigureOut">
               <a:rPr lang="en-US" smtClean="0"/>
-              <a:t>11/2/2016</a:t>
+              <a:t>11/5/2016</a:t>
             </a:fld>
             <a:endParaRPr lang="en-US"/>
           </a:p>
@@ -2187,7 +2187,7 @@
           <a:p>
             <a:fld id="{EB640143-E19F-45F2-BCBF-04629A74F388}" type="datetimeFigureOut">
               <a:rPr lang="en-US" smtClean="0"/>
-              <a:t>11/2/2016</a:t>
+              <a:t>11/5/2016</a:t>
             </a:fld>
             <a:endParaRPr lang="en-US"/>
           </a:p>
@@ -2282,7 +2282,7 @@
           <a:p>
             <a:fld id="{EB640143-E19F-45F2-BCBF-04629A74F388}" type="datetimeFigureOut">
               <a:rPr lang="en-US" smtClean="0"/>
-              <a:t>11/2/2016</a:t>
+              <a:t>11/5/2016</a:t>
             </a:fld>
             <a:endParaRPr lang="en-US"/>
           </a:p>
@@ -2557,7 +2557,7 @@
           <a:p>
             <a:fld id="{EB640143-E19F-45F2-BCBF-04629A74F388}" type="datetimeFigureOut">
               <a:rPr lang="en-US" smtClean="0"/>
-              <a:t>11/2/2016</a:t>
+              <a:t>11/5/2016</a:t>
             </a:fld>
             <a:endParaRPr lang="en-US"/>
           </a:p>
@@ -2809,7 +2809,7 @@
           <a:p>
             <a:fld id="{EB640143-E19F-45F2-BCBF-04629A74F388}" type="datetimeFigureOut">
               <a:rPr lang="en-US" smtClean="0"/>
-              <a:t>11/2/2016</a:t>
+              <a:t>11/5/2016</a:t>
             </a:fld>
             <a:endParaRPr lang="en-US"/>
           </a:p>
@@ -3020,7 +3020,7 @@
           <a:p>
             <a:fld id="{EB640143-E19F-45F2-BCBF-04629A74F388}" type="datetimeFigureOut">
               <a:rPr lang="en-US" smtClean="0"/>
-              <a:t>11/2/2016</a:t>
+              <a:t>11/5/2016</a:t>
             </a:fld>
             <a:endParaRPr lang="en-US"/>
           </a:p>
@@ -3510,7 +3510,15 @@
           <a:p>
             <a:r>
               <a:rPr lang="en-US" dirty="0"/>
-              <a:t>Copyright © 2015, Rinworks, LLC</a:t>
+              <a:t>Copyright © 2015, </a:t>
+            </a:r>
+            <a:r>
+              <a:rPr lang="en-US"/>
+              <a:t>2016 Rinworks</a:t>
+            </a:r>
+            <a:r>
+              <a:rPr lang="en-US" dirty="0"/>
+              <a:t>, LLC</a:t>
             </a:r>
             <a:br>
               <a:rPr lang="en-US" dirty="0"/>
@@ -4862,18 +4870,18 @@
 
 <file path=customXml/item1.xml><?xml version="1.0" encoding="utf-8"?>
 <athena xmlns="http://schemas.microsoft.com/edu/athena" version="0.1.3396.0">
-  <timings duration="24035"/>
+  <media streamable="true" recordStart="0" recordEnd="24035" recordLength="95333" audioOnly="true" start="0" end="24035" audioFormat="{00001610-0000-0010-8000-00AA00389B71}" audioRate="44100" muted="false" volume="0.8" fadeIn="0" fadeOut="0" videoFormat="{34363248-0000-0010-8000-00AA00389B71}" videoRate="15" videoWidth="256" videoHeight="256"/>
 </athena>
 </file>
 
 <file path=customXml/item2.xml><?xml version="1.0" encoding="utf-8"?>
 <athena xmlns="http://schemas.microsoft.com/edu/athena" version="0.1.3396.0">
-  <media streamable="true" recordStart="0" recordEnd="24035" recordLength="95333" audioOnly="true" start="0" end="24035" audioFormat="{00001610-0000-0010-8000-00AA00389B71}" audioRate="44100" muted="false" volume="0.8" fadeIn="0" fadeOut="0" videoFormat="{34363248-0000-0010-8000-00AA00389B71}" videoRate="15" videoWidth="256" videoHeight="256"/>
+  <timings duration="24035"/>
 </athena>
 </file>
 
 <file path=customXml/itemProps1.xml><?xml version="1.0" encoding="utf-8"?>
-<ds:datastoreItem xmlns:ds="http://schemas.openxmlformats.org/officeDocument/2006/customXml" ds:itemID="{B17A48FB-DDB1-4628-9629-5E18D0A35F2E}">
+<ds:datastoreItem xmlns:ds="http://schemas.openxmlformats.org/officeDocument/2006/customXml" ds:itemID="{13F46FCB-918E-4816-8A8C-A50CF511954F}">
   <ds:schemaRefs>
     <ds:schemaRef ds:uri="http://schemas.microsoft.com/edu/athena"/>
   </ds:schemaRefs>
@@ -4881,7 +4889,7 @@
 </file>
 
 <file path=customXml/itemProps2.xml><?xml version="1.0" encoding="utf-8"?>
-<ds:datastoreItem xmlns:ds="http://schemas.openxmlformats.org/officeDocument/2006/customXml" ds:itemID="{13F46FCB-918E-4816-8A8C-A50CF511954F}">
+<ds:datastoreItem xmlns:ds="http://schemas.openxmlformats.org/officeDocument/2006/customXml" ds:itemID="{B17A48FB-DDB1-4628-9629-5E18D0A35F2E}">
   <ds:schemaRefs>
     <ds:schemaRef ds:uri="http://schemas.microsoft.com/edu/athena"/>
   </ds:schemaRefs>

</xml_diff>